<commit_message>
Add block scheme to presentation
</commit_message>
<xml_diff>
--- a/Documentation & Presentation/Presentation.pptx
+++ b/Documentation & Presentation/Presentation.pptx
@@ -270,6 +270,11 @@
       </a:defRPr>
     </a:lvl9pPr>
   </p:defaultTextStyle>
+  <p:extLst>
+    <p:ext uri="{EFAFB233-063F-42B5-8137-9DF3F51BA10A}">
+      <p15:sldGuideLst xmlns:p15="http://schemas.microsoft.com/office/powerpoint/2012/main"/>
+    </p:ext>
+  </p:extLst>
 </p:presentation>
 </file>
 
@@ -5965,14 +5970,40 @@
             <a:pPr marL="25400" indent="0">
               <a:buNone/>
             </a:pPr>
-            <a:r>
-              <a:rPr lang="bg-BG"/>
-              <a:t>Блок схема...</a:t>
-            </a:r>
             <a:endParaRPr lang="en-US" dirty="0"/>
           </a:p>
         </p:txBody>
       </p:sp>
+      <p:pic>
+        <p:nvPicPr>
+          <p:cNvPr id="6" name="Picture 5" descr="Diagram&#10;&#10;Description automatically generated">
+            <a:extLst>
+              <a:ext uri="{FF2B5EF4-FFF2-40B4-BE49-F238E27FC236}">
+                <a16:creationId xmlns:a16="http://schemas.microsoft.com/office/drawing/2014/main" id="{053F4B73-29EF-4F87-9886-DEB33C03FC11}"/>
+              </a:ext>
+            </a:extLst>
+          </p:cNvPr>
+          <p:cNvPicPr>
+            <a:picLocks noChangeAspect="1"/>
+          </p:cNvPicPr>
+          <p:nvPr/>
+        </p:nvPicPr>
+        <p:blipFill>
+          <a:blip r:embed="rId3"/>
+          <a:stretch>
+            <a:fillRect/>
+          </a:stretch>
+        </p:blipFill>
+        <p:spPr>
+          <a:xfrm>
+            <a:off x="2151704" y="0"/>
+            <a:ext cx="4840592" cy="5143500"/>
+          </a:xfrm>
+          <a:prstGeom prst="rect">
+            <a:avLst/>
+          </a:prstGeom>
+        </p:spPr>
+      </p:pic>
     </p:spTree>
   </p:cSld>
   <p:clrMapOvr>

</xml_diff>